<commit_message>
Add new ppts or Update ppts scale to 16:9
</commit_message>
<xml_diff>
--- a/揀選(崇拜版).pptx
+++ b/揀選(崇拜版).pptx
@@ -7,10 +7,9 @@
   <p:sldIdLst>
     <p:sldId id="256" r:id="rId2"/>
     <p:sldId id="257" r:id="rId3"/>
-    <p:sldId id="258" r:id="rId4"/>
-    <p:sldId id="259" r:id="rId5"/>
+    <p:sldId id="259" r:id="rId4"/>
   </p:sldIdLst>
-  <p:sldSz cx="9144000" cy="6858000" type="screen4x3"/>
+  <p:sldSz cx="9144000" cy="5143500" type="screen16x9"/>
   <p:notesSz cx="6858000" cy="9144000"/>
   <p:defaultTextStyle>
     <a:defPPr>
@@ -139,8 +138,8 @@
         </p:nvSpPr>
         <p:spPr>
           <a:xfrm>
-            <a:off x="685800" y="2130425"/>
-            <a:ext cx="7772400" cy="1470025"/>
+            <a:off x="685800" y="1597819"/>
+            <a:ext cx="7772400" cy="1102519"/>
           </a:xfrm>
         </p:spPr>
         <p:txBody>
@@ -167,8 +166,8 @@
         </p:nvSpPr>
         <p:spPr>
           <a:xfrm>
-            <a:off x="1371600" y="3886200"/>
-            <a:ext cx="6400800" cy="1752600"/>
+            <a:off x="1371600" y="2914650"/>
+            <a:ext cx="6400800" cy="1314450"/>
           </a:xfrm>
         </p:spPr>
         <p:txBody>
@@ -291,7 +290,7 @@
           <a:p>
             <a:fld id="{99ACEE97-997B-4A4F-AF3D-6B6CD75D4604}" type="datetimeFigureOut">
               <a:rPr lang="zh-TW" altLang="en-US" smtClean="0"/>
-              <a:t>2018/5/12</a:t>
+              <a:t>2019/8/9</a:t>
             </a:fld>
             <a:endParaRPr lang="zh-TW" altLang="en-US"/>
           </a:p>
@@ -456,7 +455,7 @@
           <a:p>
             <a:fld id="{99ACEE97-997B-4A4F-AF3D-6B6CD75D4604}" type="datetimeFigureOut">
               <a:rPr lang="zh-TW" altLang="en-US" smtClean="0"/>
-              <a:t>2018/5/12</a:t>
+              <a:t>2019/8/9</a:t>
             </a:fld>
             <a:endParaRPr lang="zh-TW" altLang="en-US"/>
           </a:p>
@@ -541,8 +540,8 @@
         </p:nvSpPr>
         <p:spPr>
           <a:xfrm>
-            <a:off x="6629400" y="274638"/>
-            <a:ext cx="2057400" cy="5851525"/>
+            <a:off x="6629400" y="205979"/>
+            <a:ext cx="2057400" cy="4388644"/>
           </a:xfrm>
         </p:spPr>
         <p:txBody>
@@ -569,8 +568,8 @@
         </p:nvSpPr>
         <p:spPr>
           <a:xfrm>
-            <a:off x="457200" y="274638"/>
-            <a:ext cx="6019800" cy="5851525"/>
+            <a:off x="457200" y="205979"/>
+            <a:ext cx="6019800" cy="4388644"/>
           </a:xfrm>
         </p:spPr>
         <p:txBody>
@@ -631,7 +630,7 @@
           <a:p>
             <a:fld id="{99ACEE97-997B-4A4F-AF3D-6B6CD75D4604}" type="datetimeFigureOut">
               <a:rPr lang="zh-TW" altLang="en-US" smtClean="0"/>
-              <a:t>2018/5/12</a:t>
+              <a:t>2019/8/9</a:t>
             </a:fld>
             <a:endParaRPr lang="zh-TW" altLang="en-US"/>
           </a:p>
@@ -796,7 +795,7 @@
           <a:p>
             <a:fld id="{99ACEE97-997B-4A4F-AF3D-6B6CD75D4604}" type="datetimeFigureOut">
               <a:rPr lang="zh-TW" altLang="en-US" smtClean="0"/>
-              <a:t>2018/5/12</a:t>
+              <a:t>2019/8/9</a:t>
             </a:fld>
             <a:endParaRPr lang="zh-TW" altLang="en-US"/>
           </a:p>
@@ -881,8 +880,8 @@
         </p:nvSpPr>
         <p:spPr>
           <a:xfrm>
-            <a:off x="722313" y="4406900"/>
-            <a:ext cx="7772400" cy="1362075"/>
+            <a:off x="722313" y="3305176"/>
+            <a:ext cx="7772400" cy="1021556"/>
           </a:xfrm>
         </p:spPr>
         <p:txBody>
@@ -913,8 +912,8 @@
         </p:nvSpPr>
         <p:spPr>
           <a:xfrm>
-            <a:off x="722313" y="2906713"/>
-            <a:ext cx="7772400" cy="1500187"/>
+            <a:off x="722313" y="2180035"/>
+            <a:ext cx="7772400" cy="1125140"/>
           </a:xfrm>
         </p:spPr>
         <p:txBody>
@@ -1037,7 +1036,7 @@
           <a:p>
             <a:fld id="{99ACEE97-997B-4A4F-AF3D-6B6CD75D4604}" type="datetimeFigureOut">
               <a:rPr lang="zh-TW" altLang="en-US" smtClean="0"/>
-              <a:t>2018/5/12</a:t>
+              <a:t>2019/8/9</a:t>
             </a:fld>
             <a:endParaRPr lang="zh-TW" altLang="en-US"/>
           </a:p>
@@ -1145,8 +1144,8 @@
         </p:nvSpPr>
         <p:spPr>
           <a:xfrm>
-            <a:off x="457200" y="1600200"/>
-            <a:ext cx="4038600" cy="4525963"/>
+            <a:off x="457200" y="1200151"/>
+            <a:ext cx="4038600" cy="3394472"/>
           </a:xfrm>
         </p:spPr>
         <p:txBody>
@@ -1230,8 +1229,8 @@
         </p:nvSpPr>
         <p:spPr>
           <a:xfrm>
-            <a:off x="4648200" y="1600200"/>
-            <a:ext cx="4038600" cy="4525963"/>
+            <a:off x="4648200" y="1200151"/>
+            <a:ext cx="4038600" cy="3394472"/>
           </a:xfrm>
         </p:spPr>
         <p:txBody>
@@ -1320,7 +1319,7 @@
           <a:p>
             <a:fld id="{99ACEE97-997B-4A4F-AF3D-6B6CD75D4604}" type="datetimeFigureOut">
               <a:rPr lang="zh-TW" altLang="en-US" smtClean="0"/>
-              <a:t>2018/5/12</a:t>
+              <a:t>2019/8/9</a:t>
             </a:fld>
             <a:endParaRPr lang="zh-TW" altLang="en-US"/>
           </a:p>
@@ -1432,8 +1431,8 @@
         </p:nvSpPr>
         <p:spPr>
           <a:xfrm>
-            <a:off x="457200" y="1535113"/>
-            <a:ext cx="4040188" cy="639762"/>
+            <a:off x="457200" y="1151335"/>
+            <a:ext cx="4040188" cy="479822"/>
           </a:xfrm>
         </p:spPr>
         <p:txBody>
@@ -1497,8 +1496,8 @@
         </p:nvSpPr>
         <p:spPr>
           <a:xfrm>
-            <a:off x="457200" y="2174875"/>
-            <a:ext cx="4040188" cy="3951288"/>
+            <a:off x="457200" y="1631156"/>
+            <a:ext cx="4040188" cy="2963466"/>
           </a:xfrm>
         </p:spPr>
         <p:txBody>
@@ -1582,8 +1581,8 @@
         </p:nvSpPr>
         <p:spPr>
           <a:xfrm>
-            <a:off x="4645025" y="1535113"/>
-            <a:ext cx="4041775" cy="639762"/>
+            <a:off x="4645026" y="1151335"/>
+            <a:ext cx="4041775" cy="479822"/>
           </a:xfrm>
         </p:spPr>
         <p:txBody>
@@ -1647,8 +1646,8 @@
         </p:nvSpPr>
         <p:spPr>
           <a:xfrm>
-            <a:off x="4645025" y="2174875"/>
-            <a:ext cx="4041775" cy="3951288"/>
+            <a:off x="4645026" y="1631156"/>
+            <a:ext cx="4041775" cy="2963466"/>
           </a:xfrm>
         </p:spPr>
         <p:txBody>
@@ -1737,7 +1736,7 @@
           <a:p>
             <a:fld id="{99ACEE97-997B-4A4F-AF3D-6B6CD75D4604}" type="datetimeFigureOut">
               <a:rPr lang="zh-TW" altLang="en-US" smtClean="0"/>
-              <a:t>2018/5/12</a:t>
+              <a:t>2019/8/9</a:t>
             </a:fld>
             <a:endParaRPr lang="zh-TW" altLang="en-US"/>
           </a:p>
@@ -1850,7 +1849,7 @@
           <a:p>
             <a:fld id="{99ACEE97-997B-4A4F-AF3D-6B6CD75D4604}" type="datetimeFigureOut">
               <a:rPr lang="zh-TW" altLang="en-US" smtClean="0"/>
-              <a:t>2018/5/12</a:t>
+              <a:t>2019/8/9</a:t>
             </a:fld>
             <a:endParaRPr lang="zh-TW" altLang="en-US"/>
           </a:p>
@@ -1940,7 +1939,7 @@
           <a:p>
             <a:fld id="{99ACEE97-997B-4A4F-AF3D-6B6CD75D4604}" type="datetimeFigureOut">
               <a:rPr lang="zh-TW" altLang="en-US" smtClean="0"/>
-              <a:t>2018/5/12</a:t>
+              <a:t>2019/8/9</a:t>
             </a:fld>
             <a:endParaRPr lang="zh-TW" altLang="en-US"/>
           </a:p>
@@ -2025,8 +2024,8 @@
         </p:nvSpPr>
         <p:spPr>
           <a:xfrm>
-            <a:off x="457200" y="273050"/>
-            <a:ext cx="3008313" cy="1162050"/>
+            <a:off x="457201" y="204787"/>
+            <a:ext cx="3008313" cy="871538"/>
           </a:xfrm>
         </p:spPr>
         <p:txBody>
@@ -2057,8 +2056,8 @@
         </p:nvSpPr>
         <p:spPr>
           <a:xfrm>
-            <a:off x="3575050" y="273050"/>
-            <a:ext cx="5111750" cy="5853113"/>
+            <a:off x="3575050" y="204788"/>
+            <a:ext cx="5111750" cy="4389835"/>
           </a:xfrm>
         </p:spPr>
         <p:txBody>
@@ -2142,8 +2141,8 @@
         </p:nvSpPr>
         <p:spPr>
           <a:xfrm>
-            <a:off x="457200" y="1435100"/>
-            <a:ext cx="3008313" cy="4691063"/>
+            <a:off x="457201" y="1076326"/>
+            <a:ext cx="3008313" cy="3518297"/>
           </a:xfrm>
         </p:spPr>
         <p:txBody>
@@ -2212,7 +2211,7 @@
           <a:p>
             <a:fld id="{99ACEE97-997B-4A4F-AF3D-6B6CD75D4604}" type="datetimeFigureOut">
               <a:rPr lang="zh-TW" altLang="en-US" smtClean="0"/>
-              <a:t>2018/5/12</a:t>
+              <a:t>2019/8/9</a:t>
             </a:fld>
             <a:endParaRPr lang="zh-TW" altLang="en-US"/>
           </a:p>
@@ -2297,8 +2296,8 @@
         </p:nvSpPr>
         <p:spPr>
           <a:xfrm>
-            <a:off x="1792288" y="4800600"/>
-            <a:ext cx="5486400" cy="566738"/>
+            <a:off x="1792288" y="3600450"/>
+            <a:ext cx="5486400" cy="425054"/>
           </a:xfrm>
         </p:spPr>
         <p:txBody>
@@ -2329,8 +2328,8 @@
         </p:nvSpPr>
         <p:spPr>
           <a:xfrm>
-            <a:off x="1792288" y="612775"/>
-            <a:ext cx="5486400" cy="4114800"/>
+            <a:off x="1792288" y="459581"/>
+            <a:ext cx="5486400" cy="3086100"/>
           </a:xfrm>
         </p:spPr>
         <p:txBody>
@@ -2394,8 +2393,8 @@
         </p:nvSpPr>
         <p:spPr>
           <a:xfrm>
-            <a:off x="1792288" y="5367338"/>
-            <a:ext cx="5486400" cy="804862"/>
+            <a:off x="1792288" y="4025503"/>
+            <a:ext cx="5486400" cy="603647"/>
           </a:xfrm>
         </p:spPr>
         <p:txBody>
@@ -2464,7 +2463,7 @@
           <a:p>
             <a:fld id="{99ACEE97-997B-4A4F-AF3D-6B6CD75D4604}" type="datetimeFigureOut">
               <a:rPr lang="zh-TW" altLang="en-US" smtClean="0"/>
-              <a:t>2018/5/12</a:t>
+              <a:t>2019/8/9</a:t>
             </a:fld>
             <a:endParaRPr lang="zh-TW" altLang="en-US"/>
           </a:p>
@@ -2559,8 +2558,8 @@
         </p:nvSpPr>
         <p:spPr>
           <a:xfrm>
-            <a:off x="457200" y="274638"/>
-            <a:ext cx="8229600" cy="1143000"/>
+            <a:off x="457200" y="205979"/>
+            <a:ext cx="8229600" cy="857250"/>
           </a:xfrm>
           <a:prstGeom prst="rect">
             <a:avLst/>
@@ -2592,8 +2591,8 @@
         </p:nvSpPr>
         <p:spPr>
           <a:xfrm>
-            <a:off x="457200" y="1600200"/>
-            <a:ext cx="8229600" cy="4525963"/>
+            <a:off x="457200" y="1200151"/>
+            <a:ext cx="8229600" cy="3394472"/>
           </a:xfrm>
           <a:prstGeom prst="rect">
             <a:avLst/>
@@ -2654,8 +2653,8 @@
         </p:nvSpPr>
         <p:spPr>
           <a:xfrm>
-            <a:off x="457200" y="6356350"/>
-            <a:ext cx="2133600" cy="365125"/>
+            <a:off x="457200" y="4767263"/>
+            <a:ext cx="2133600" cy="273844"/>
           </a:xfrm>
           <a:prstGeom prst="rect">
             <a:avLst/>
@@ -2677,7 +2676,7 @@
           <a:p>
             <a:fld id="{99ACEE97-997B-4A4F-AF3D-6B6CD75D4604}" type="datetimeFigureOut">
               <a:rPr lang="zh-TW" altLang="en-US" smtClean="0"/>
-              <a:t>2018/5/12</a:t>
+              <a:t>2019/8/9</a:t>
             </a:fld>
             <a:endParaRPr lang="zh-TW" altLang="en-US"/>
           </a:p>
@@ -2695,8 +2694,8 @@
         </p:nvSpPr>
         <p:spPr>
           <a:xfrm>
-            <a:off x="3124200" y="6356350"/>
-            <a:ext cx="2895600" cy="365125"/>
+            <a:off x="3124200" y="4767263"/>
+            <a:ext cx="2895600" cy="273844"/>
           </a:xfrm>
           <a:prstGeom prst="rect">
             <a:avLst/>
@@ -2732,8 +2731,8 @@
         </p:nvSpPr>
         <p:spPr>
           <a:xfrm>
-            <a:off x="6553200" y="6356350"/>
-            <a:ext cx="2133600" cy="365125"/>
+            <a:off x="6553200" y="4767263"/>
+            <a:ext cx="2133600" cy="273844"/>
           </a:xfrm>
           <a:prstGeom prst="rect">
             <a:avLst/>
@@ -3059,11 +3058,13 @@
         </p:nvSpPr>
         <p:spPr/>
         <p:txBody>
-          <a:bodyPr/>
-          <a:lstStyle/>
-          <a:p>
-            <a:r>
-              <a:rPr lang="zh-CN" altLang="en-US" b="1" dirty="0" smtClean="0">
+          <a:bodyPr>
+            <a:normAutofit/>
+          </a:bodyPr>
+          <a:lstStyle/>
+          <a:p>
+            <a:r>
+              <a:rPr lang="zh-CN" altLang="en-US" sz="4000" b="1" dirty="0" smtClean="0">
                 <a:solidFill>
                   <a:srgbClr val="660033"/>
                 </a:solidFill>
@@ -3072,7 +3073,7 @@
               </a:rPr>
               <a:t>揀選</a:t>
             </a:r>
-            <a:endParaRPr lang="zh-TW" altLang="en-US" b="1" dirty="0">
+            <a:endParaRPr lang="zh-TW" altLang="en-US" sz="4000" b="1" dirty="0">
               <a:solidFill>
                 <a:srgbClr val="660033"/>
               </a:solidFill>
@@ -3092,10 +3093,15 @@
             <p:ph idx="1"/>
           </p:nvPr>
         </p:nvSpPr>
-        <p:spPr/>
+        <p:spPr>
+          <a:xfrm>
+            <a:off x="0" y="1200151"/>
+            <a:ext cx="9144000" cy="3394472"/>
+          </a:xfrm>
+        </p:spPr>
         <p:txBody>
           <a:bodyPr>
-            <a:normAutofit/>
+            <a:noAutofit/>
           </a:bodyPr>
           <a:lstStyle/>
           <a:p>
@@ -3103,7 +3109,7 @@
               <a:buNone/>
             </a:pPr>
             <a:r>
-              <a:rPr lang="zh-TW" altLang="en-US" sz="5400" b="1" dirty="0" smtClean="0">
+              <a:rPr lang="zh-TW" altLang="en-US" sz="4800" b="1" dirty="0" smtClean="0">
                 <a:solidFill>
                   <a:srgbClr val="660033"/>
                 </a:solidFill>
@@ -3113,7 +3119,7 @@
               <a:t>你十字架的大</a:t>
             </a:r>
             <a:r>
-              <a:rPr lang="zh-TW" altLang="en-US" sz="5400" b="1" dirty="0" smtClean="0">
+              <a:rPr lang="zh-TW" altLang="en-US" sz="4800" b="1" dirty="0" smtClean="0">
                 <a:solidFill>
                   <a:srgbClr val="660033"/>
                 </a:solidFill>
@@ -3122,7 +3128,7 @@
               </a:rPr>
               <a:t>能</a:t>
             </a:r>
-            <a:endParaRPr lang="en-US" altLang="zh-TW" sz="5400" b="1" dirty="0" smtClean="0">
+            <a:endParaRPr lang="en-US" altLang="zh-TW" sz="4800" b="1" dirty="0" smtClean="0">
               <a:solidFill>
                 <a:srgbClr val="660033"/>
               </a:solidFill>
@@ -3135,36 +3141,16 @@
               <a:buNone/>
             </a:pPr>
             <a:r>
-              <a:rPr lang="zh-TW" altLang="en-US" sz="5400" b="1" dirty="0" smtClean="0">
+              <a:rPr lang="zh-TW" altLang="en-US" sz="4800" b="1" dirty="0" smtClean="0">
                 <a:solidFill>
                   <a:srgbClr val="660033"/>
                 </a:solidFill>
                 <a:latin typeface="微軟正黑體" pitchFamily="34" charset="-120"/>
                 <a:ea typeface="微軟正黑體" pitchFamily="34" charset="-120"/>
               </a:rPr>
-              <a:t>重價</a:t>
-            </a:r>
-            <a:r>
-              <a:rPr lang="zh-TW" altLang="en-US" sz="5400" b="1" dirty="0" smtClean="0">
-                <a:solidFill>
-                  <a:srgbClr val="660033"/>
-                </a:solidFill>
-                <a:latin typeface="微軟正黑體" pitchFamily="34" charset="-120"/>
-                <a:ea typeface="微軟正黑體" pitchFamily="34" charset="-120"/>
-              </a:rPr>
-              <a:t>贖回我</a:t>
-            </a:r>
-            <a:r>
-              <a:rPr lang="zh-TW" altLang="en-US" sz="5400" b="1" dirty="0" smtClean="0">
-                <a:solidFill>
-                  <a:srgbClr val="660033"/>
-                </a:solidFill>
-                <a:latin typeface="微軟正黑體" pitchFamily="34" charset="-120"/>
-                <a:ea typeface="微軟正黑體" pitchFamily="34" charset="-120"/>
-              </a:rPr>
-              <a:t>靈魂</a:t>
-            </a:r>
-            <a:endParaRPr lang="en-US" altLang="zh-TW" sz="5400" b="1" dirty="0" smtClean="0">
+              <a:t>重價贖回我靈魂</a:t>
+            </a:r>
+            <a:endParaRPr lang="en-US" altLang="zh-TW" sz="4800" b="1" dirty="0" smtClean="0">
               <a:solidFill>
                 <a:srgbClr val="660033"/>
               </a:solidFill>
@@ -3177,7 +3163,7 @@
               <a:buNone/>
             </a:pPr>
             <a:r>
-              <a:rPr lang="zh-TW" altLang="en-US" sz="5400" b="1" dirty="0" smtClean="0">
+              <a:rPr lang="zh-TW" altLang="en-US" sz="4800" b="1" dirty="0" smtClean="0">
                 <a:solidFill>
                   <a:srgbClr val="660033"/>
                 </a:solidFill>
@@ -3187,7 +3173,7 @@
               <a:t>你</a:t>
             </a:r>
             <a:r>
-              <a:rPr lang="zh-TW" altLang="en-US" sz="5400" b="1" dirty="0" smtClean="0">
+              <a:rPr lang="zh-TW" altLang="en-US" sz="4800" b="1" dirty="0" smtClean="0">
                 <a:solidFill>
                   <a:srgbClr val="660033"/>
                 </a:solidFill>
@@ -3197,7 +3183,7 @@
               <a:t>恩典使我被揀</a:t>
             </a:r>
             <a:r>
-              <a:rPr lang="zh-TW" altLang="en-US" sz="5400" b="1" dirty="0" smtClean="0">
+              <a:rPr lang="zh-TW" altLang="en-US" sz="4800" b="1" dirty="0" smtClean="0">
                 <a:solidFill>
                   <a:srgbClr val="660033"/>
                 </a:solidFill>
@@ -3206,7 +3192,7 @@
               </a:rPr>
               <a:t>選</a:t>
             </a:r>
-            <a:endParaRPr lang="en-US" altLang="zh-TW" sz="5400" b="1" dirty="0" smtClean="0">
+            <a:endParaRPr lang="en-US" altLang="zh-TW" sz="4800" b="1" dirty="0" smtClean="0">
               <a:solidFill>
                 <a:srgbClr val="660033"/>
               </a:solidFill>
@@ -3219,26 +3205,16 @@
               <a:buNone/>
             </a:pPr>
             <a:r>
-              <a:rPr lang="zh-TW" altLang="en-US" sz="5400" b="1" dirty="0" smtClean="0">
+              <a:rPr lang="zh-TW" altLang="en-US" sz="4800" b="1" dirty="0" smtClean="0">
                 <a:solidFill>
                   <a:srgbClr val="660033"/>
                 </a:solidFill>
                 <a:latin typeface="微軟正黑體" pitchFamily="34" charset="-120"/>
                 <a:ea typeface="微軟正黑體" pitchFamily="34" charset="-120"/>
               </a:rPr>
-              <a:t>叫</a:t>
-            </a:r>
-            <a:r>
-              <a:rPr lang="zh-TW" altLang="en-US" sz="5400" b="1" dirty="0" smtClean="0">
-                <a:solidFill>
-                  <a:srgbClr val="660033"/>
-                </a:solidFill>
-                <a:latin typeface="微軟正黑體" pitchFamily="34" charset="-120"/>
-                <a:ea typeface="微軟正黑體" pitchFamily="34" charset="-120"/>
-              </a:rPr>
-              <a:t>我生命果子常存</a:t>
-            </a:r>
-            <a:endParaRPr lang="zh-TW" altLang="en-US" sz="5400" b="1" dirty="0">
+              <a:t>叫我生命果子常存</a:t>
+            </a:r>
+            <a:endParaRPr lang="zh-TW" altLang="en-US" sz="4800" b="1" dirty="0">
               <a:solidFill>
                 <a:srgbClr val="660033"/>
               </a:solidFill>
@@ -3285,11 +3261,13 @@
         </p:nvSpPr>
         <p:spPr/>
         <p:txBody>
-          <a:bodyPr/>
-          <a:lstStyle/>
-          <a:p>
-            <a:r>
-              <a:rPr lang="zh-CN" altLang="en-US" b="1" dirty="0" smtClean="0">
+          <a:bodyPr>
+            <a:normAutofit/>
+          </a:bodyPr>
+          <a:lstStyle/>
+          <a:p>
+            <a:r>
+              <a:rPr lang="zh-CN" altLang="en-US" sz="4000" b="1" dirty="0">
                 <a:solidFill>
                   <a:srgbClr val="660033"/>
                 </a:solidFill>
@@ -3298,7 +3276,7 @@
               </a:rPr>
               <a:t>揀選</a:t>
             </a:r>
-            <a:endParaRPr lang="zh-TW" altLang="en-US" b="1" dirty="0">
+            <a:endParaRPr lang="zh-TW" altLang="en-US" sz="4000" b="1" dirty="0">
               <a:solidFill>
                 <a:srgbClr val="660033"/>
               </a:solidFill>
@@ -3318,7 +3296,12 @@
             <p:ph idx="1"/>
           </p:nvPr>
         </p:nvSpPr>
-        <p:spPr/>
+        <p:spPr>
+          <a:xfrm>
+            <a:off x="0" y="1200150"/>
+            <a:ext cx="9144000" cy="3943349"/>
+          </a:xfrm>
+        </p:spPr>
         <p:txBody>
           <a:bodyPr>
             <a:normAutofit/>
@@ -3329,7 +3312,7 @@
               <a:buNone/>
             </a:pPr>
             <a:r>
-              <a:rPr lang="zh-TW" altLang="en-US" sz="5400" b="1" dirty="0" smtClean="0">
+              <a:rPr lang="zh-TW" altLang="en-US" sz="4800" b="1" dirty="0">
                 <a:solidFill>
                   <a:srgbClr val="660033"/>
                 </a:solidFill>
@@ -3338,7 +3321,7 @@
               </a:rPr>
               <a:t>求主用我來贏得更多靈魂</a:t>
             </a:r>
-            <a:endParaRPr lang="en-US" altLang="zh-TW" sz="5400" b="1" dirty="0" smtClean="0">
+            <a:endParaRPr lang="en-US" altLang="zh-TW" sz="4800" b="1" dirty="0">
               <a:solidFill>
                 <a:srgbClr val="660033"/>
               </a:solidFill>
@@ -3351,16 +3334,46 @@
               <a:buNone/>
             </a:pPr>
             <a:r>
-              <a:rPr lang="zh-TW" altLang="en-US" sz="5400" b="1" dirty="0" smtClean="0">
+              <a:rPr lang="zh-TW" altLang="en-US" sz="4800" b="1" dirty="0">
                 <a:solidFill>
                   <a:srgbClr val="660033"/>
                 </a:solidFill>
                 <a:latin typeface="微軟正黑體" pitchFamily="34" charset="-120"/>
                 <a:ea typeface="微軟正黑體" pitchFamily="34" charset="-120"/>
               </a:rPr>
-              <a:t>堅固我  潔淨我</a:t>
-            </a:r>
-            <a:endParaRPr lang="en-US" altLang="zh-TW" sz="5400" b="1" dirty="0" smtClean="0">
+              <a:t>堅固我  潔淨</a:t>
+            </a:r>
+            <a:r>
+              <a:rPr lang="zh-TW" altLang="en-US" sz="4800" b="1" dirty="0" smtClean="0">
+                <a:solidFill>
+                  <a:srgbClr val="660033"/>
+                </a:solidFill>
+                <a:latin typeface="微軟正黑體" pitchFamily="34" charset="-120"/>
+                <a:ea typeface="微軟正黑體" pitchFamily="34" charset="-120"/>
+              </a:rPr>
+              <a:t>我  委</a:t>
+            </a:r>
+            <a:r>
+              <a:rPr lang="zh-TW" altLang="en-US" sz="4800" b="1" dirty="0">
+                <a:solidFill>
+                  <a:srgbClr val="660033"/>
+                </a:solidFill>
+                <a:latin typeface="微軟正黑體" pitchFamily="34" charset="-120"/>
+                <a:ea typeface="微軟正黑體" pitchFamily="34" charset="-120"/>
+              </a:rPr>
+              <a:t>身做你門</a:t>
+            </a:r>
+            <a:r>
+              <a:rPr lang="zh-TW" altLang="en-US" sz="4800" b="1" dirty="0" smtClean="0">
+                <a:solidFill>
+                  <a:srgbClr val="660033"/>
+                </a:solidFill>
+                <a:latin typeface="微軟正黑體" pitchFamily="34" charset="-120"/>
+                <a:ea typeface="微軟正黑體" pitchFamily="34" charset="-120"/>
+              </a:rPr>
+              <a:t>徒</a:t>
+            </a:r>
+            <a:endParaRPr lang="en-US" altLang="zh-TW" sz="4800" b="1" dirty="0" smtClean="0">
               <a:solidFill>
                 <a:srgbClr val="660033"/>
               </a:solidFill>
@@ -3373,15 +3386,74 @@
               <a:buNone/>
             </a:pPr>
             <a:r>
-              <a:rPr lang="zh-TW" altLang="en-US" sz="5400" b="1" dirty="0" smtClean="0">
+              <a:rPr lang="zh-TW" altLang="en-US" sz="4800" b="1" dirty="0">
                 <a:solidFill>
                   <a:srgbClr val="660033"/>
                 </a:solidFill>
                 <a:latin typeface="微軟正黑體" pitchFamily="34" charset="-120"/>
                 <a:ea typeface="微軟正黑體" pitchFamily="34" charset="-120"/>
               </a:rPr>
-              <a:t>委身做你門徒</a:t>
-            </a:r>
+              <a:t>求主差遣我去傳揚你的愛</a:t>
+            </a:r>
+            <a:endParaRPr lang="en-US" altLang="zh-TW" sz="4800" b="1" dirty="0">
+              <a:solidFill>
+                <a:srgbClr val="660033"/>
+              </a:solidFill>
+              <a:latin typeface="微軟正黑體" pitchFamily="34" charset="-120"/>
+              <a:ea typeface="微軟正黑體" pitchFamily="34" charset="-120"/>
+            </a:endParaRPr>
+          </a:p>
+          <a:p>
+            <a:pPr algn="ctr">
+              <a:buNone/>
+            </a:pPr>
+            <a:r>
+              <a:rPr lang="zh-TW" altLang="en-US" sz="4800" b="1" dirty="0">
+                <a:solidFill>
+                  <a:srgbClr val="660033"/>
+                </a:solidFill>
+                <a:latin typeface="微軟正黑體" pitchFamily="34" charset="-120"/>
+                <a:ea typeface="微軟正黑體" pitchFamily="34" charset="-120"/>
+              </a:rPr>
+              <a:t>以愛擁抱城市</a:t>
+            </a:r>
+            <a:r>
+              <a:rPr lang="en-US" altLang="zh-TW" sz="4800" b="1" dirty="0">
+                <a:solidFill>
+                  <a:srgbClr val="660033"/>
+                </a:solidFill>
+                <a:latin typeface="微軟正黑體" pitchFamily="34" charset="-120"/>
+                <a:ea typeface="微軟正黑體" pitchFamily="34" charset="-120"/>
+              </a:rPr>
+              <a:t>  </a:t>
+            </a:r>
+            <a:r>
+              <a:rPr lang="zh-TW" altLang="en-US" sz="4800" b="1" dirty="0">
+                <a:solidFill>
+                  <a:srgbClr val="660033"/>
+                </a:solidFill>
+                <a:latin typeface="微軟正黑體" pitchFamily="34" charset="-120"/>
+                <a:ea typeface="微軟正黑體" pitchFamily="34" charset="-120"/>
+              </a:rPr>
+              <a:t>建立合一教</a:t>
+            </a:r>
+            <a:r>
+              <a:rPr lang="zh-TW" altLang="en-US" sz="4800" b="1" dirty="0" smtClean="0">
+                <a:solidFill>
+                  <a:srgbClr val="660033"/>
+                </a:solidFill>
+                <a:latin typeface="微軟正黑體" pitchFamily="34" charset="-120"/>
+                <a:ea typeface="微軟正黑體" pitchFamily="34" charset="-120"/>
+              </a:rPr>
+              <a:t>會</a:t>
+            </a:r>
+            <a:endParaRPr lang="zh-TW" altLang="en-US" sz="4800" b="1" dirty="0">
+              <a:solidFill>
+                <a:srgbClr val="660033"/>
+              </a:solidFill>
+              <a:latin typeface="微軟正黑體" pitchFamily="34" charset="-120"/>
+              <a:ea typeface="微軟正黑體" pitchFamily="34" charset="-120"/>
+            </a:endParaRPr>
           </a:p>
         </p:txBody>
       </p:sp>
@@ -3422,11 +3494,13 @@
         </p:nvSpPr>
         <p:spPr/>
         <p:txBody>
-          <a:bodyPr/>
-          <a:lstStyle/>
-          <a:p>
-            <a:r>
-              <a:rPr lang="zh-CN" altLang="en-US" b="1" dirty="0" smtClean="0">
+          <a:bodyPr>
+            <a:normAutofit/>
+          </a:bodyPr>
+          <a:lstStyle/>
+          <a:p>
+            <a:r>
+              <a:rPr lang="zh-CN" altLang="en-US" sz="4000" b="1" dirty="0">
                 <a:solidFill>
                   <a:srgbClr val="660033"/>
                 </a:solidFill>
@@ -3435,7 +3509,7 @@
               </a:rPr>
               <a:t>揀選</a:t>
             </a:r>
-            <a:endParaRPr lang="zh-TW" altLang="en-US" b="1" dirty="0">
+            <a:endParaRPr lang="zh-TW" altLang="en-US" sz="4000" b="1" dirty="0">
               <a:solidFill>
                 <a:srgbClr val="660033"/>
               </a:solidFill>
@@ -3466,16 +3540,16 @@
               <a:buNone/>
             </a:pPr>
             <a:r>
-              <a:rPr lang="zh-TW" altLang="en-US" sz="5400" b="1" dirty="0" smtClean="0">
+              <a:rPr lang="zh-TW" altLang="en-US" sz="4800" b="1" dirty="0">
                 <a:solidFill>
                   <a:srgbClr val="660033"/>
                 </a:solidFill>
                 <a:latin typeface="微軟正黑體" pitchFamily="34" charset="-120"/>
                 <a:ea typeface="微軟正黑體" pitchFamily="34" charset="-120"/>
               </a:rPr>
-              <a:t>求主差遣我去傳揚你的愛</a:t>
-            </a:r>
-            <a:endParaRPr lang="en-US" altLang="zh-TW" sz="5400" b="1" dirty="0" smtClean="0">
+              <a:t>賜我信心宣告</a:t>
+            </a:r>
+            <a:endParaRPr lang="en-US" altLang="zh-TW" sz="4800" b="1" dirty="0">
               <a:solidFill>
                 <a:srgbClr val="660033"/>
               </a:solidFill>
@@ -3488,16 +3562,16 @@
               <a:buNone/>
             </a:pPr>
             <a:r>
-              <a:rPr lang="zh-TW" altLang="en-US" sz="5400" b="1" dirty="0" smtClean="0">
+              <a:rPr lang="zh-TW" altLang="en-US" sz="4800" b="1" dirty="0">
                 <a:solidFill>
                   <a:srgbClr val="660033"/>
                 </a:solidFill>
                 <a:latin typeface="微軟正黑體" pitchFamily="34" charset="-120"/>
                 <a:ea typeface="微軟正黑體" pitchFamily="34" charset="-120"/>
               </a:rPr>
-              <a:t>以愛擁抱城市</a:t>
-            </a:r>
-            <a:endParaRPr lang="en-US" altLang="zh-TW" sz="5400" b="1" dirty="0" smtClean="0">
+              <a:t>在你凡事都能</a:t>
+            </a:r>
+            <a:endParaRPr lang="en-US" altLang="zh-TW" sz="4800" b="1" dirty="0">
               <a:solidFill>
                 <a:srgbClr val="660033"/>
               </a:solidFill>
@@ -3510,144 +3584,7 @@
               <a:buNone/>
             </a:pPr>
             <a:r>
-              <a:rPr lang="zh-TW" altLang="en-US" sz="5400" b="1" dirty="0" smtClean="0">
-                <a:solidFill>
-                  <a:srgbClr val="660033"/>
-                </a:solidFill>
-                <a:latin typeface="微軟正黑體" pitchFamily="34" charset="-120"/>
-                <a:ea typeface="微軟正黑體" pitchFamily="34" charset="-120"/>
-              </a:rPr>
-              <a:t>建立合一教會</a:t>
-            </a:r>
-          </a:p>
-        </p:txBody>
-      </p:sp>
-    </p:spTree>
-  </p:cSld>
-  <p:clrMapOvr>
-    <a:masterClrMapping/>
-  </p:clrMapOvr>
-</p:sld>
-</file>
-
-<file path=ppt/slides/slide4.xml><?xml version="1.0" encoding="utf-8"?>
-<p:sld xmlns:a="http://schemas.openxmlformats.org/drawingml/2006/main" xmlns:r="http://schemas.openxmlformats.org/officeDocument/2006/relationships" xmlns:p="http://schemas.openxmlformats.org/presentationml/2006/main">
-  <p:cSld>
-    <p:spTree>
-      <p:nvGrpSpPr>
-        <p:cNvPr id="1" name=""/>
-        <p:cNvGrpSpPr/>
-        <p:nvPr/>
-      </p:nvGrpSpPr>
-      <p:grpSpPr>
-        <a:xfrm>
-          <a:off x="0" y="0"/>
-          <a:ext cx="0" cy="0"/>
-          <a:chOff x="0" y="0"/>
-          <a:chExt cx="0" cy="0"/>
-        </a:xfrm>
-      </p:grpSpPr>
-      <p:sp>
-        <p:nvSpPr>
-          <p:cNvPr id="4" name="標題 3"/>
-          <p:cNvSpPr>
-            <a:spLocks noGrp="1"/>
-          </p:cNvSpPr>
-          <p:nvPr>
-            <p:ph type="title"/>
-          </p:nvPr>
-        </p:nvSpPr>
-        <p:spPr/>
-        <p:txBody>
-          <a:bodyPr/>
-          <a:lstStyle/>
-          <a:p>
-            <a:r>
-              <a:rPr lang="zh-CN" altLang="en-US" b="1" dirty="0" smtClean="0">
-                <a:solidFill>
-                  <a:srgbClr val="660033"/>
-                </a:solidFill>
-                <a:latin typeface="微軟正黑體" pitchFamily="34" charset="-120"/>
-                <a:ea typeface="微軟正黑體" pitchFamily="34" charset="-120"/>
-              </a:rPr>
-              <a:t>揀選</a:t>
-            </a:r>
-            <a:endParaRPr lang="zh-TW" altLang="en-US" b="1" dirty="0">
-              <a:solidFill>
-                <a:srgbClr val="660033"/>
-              </a:solidFill>
-              <a:latin typeface="微軟正黑體" pitchFamily="34" charset="-120"/>
-              <a:ea typeface="微軟正黑體" pitchFamily="34" charset="-120"/>
-            </a:endParaRPr>
-          </a:p>
-        </p:txBody>
-      </p:sp>
-      <p:sp>
-        <p:nvSpPr>
-          <p:cNvPr id="5" name="內容版面配置區 4"/>
-          <p:cNvSpPr>
-            <a:spLocks noGrp="1"/>
-          </p:cNvSpPr>
-          <p:nvPr>
-            <p:ph idx="1"/>
-          </p:nvPr>
-        </p:nvSpPr>
-        <p:spPr/>
-        <p:txBody>
-          <a:bodyPr>
-            <a:normAutofit/>
-          </a:bodyPr>
-          <a:lstStyle/>
-          <a:p>
-            <a:pPr algn="ctr">
-              <a:buNone/>
-            </a:pPr>
-            <a:r>
-              <a:rPr lang="zh-TW" altLang="en-US" sz="5400" b="1" dirty="0" smtClean="0">
-                <a:solidFill>
-                  <a:srgbClr val="660033"/>
-                </a:solidFill>
-                <a:latin typeface="微軟正黑體" pitchFamily="34" charset="-120"/>
-                <a:ea typeface="微軟正黑體" pitchFamily="34" charset="-120"/>
-              </a:rPr>
-              <a:t>賜我信心宣告</a:t>
-            </a:r>
-            <a:endParaRPr lang="en-US" altLang="zh-TW" sz="5400" b="1" dirty="0" smtClean="0">
-              <a:solidFill>
-                <a:srgbClr val="660033"/>
-              </a:solidFill>
-              <a:latin typeface="微軟正黑體" pitchFamily="34" charset="-120"/>
-              <a:ea typeface="微軟正黑體" pitchFamily="34" charset="-120"/>
-            </a:endParaRPr>
-          </a:p>
-          <a:p>
-            <a:pPr algn="ctr">
-              <a:buNone/>
-            </a:pPr>
-            <a:r>
-              <a:rPr lang="zh-TW" altLang="en-US" sz="5400" b="1" dirty="0" smtClean="0">
-                <a:solidFill>
-                  <a:srgbClr val="660033"/>
-                </a:solidFill>
-                <a:latin typeface="微軟正黑體" pitchFamily="34" charset="-120"/>
-                <a:ea typeface="微軟正黑體" pitchFamily="34" charset="-120"/>
-              </a:rPr>
-              <a:t>在你凡事都能</a:t>
-            </a:r>
-            <a:endParaRPr lang="en-US" altLang="zh-TW" sz="5400" b="1" dirty="0" smtClean="0">
-              <a:solidFill>
-                <a:srgbClr val="660033"/>
-              </a:solidFill>
-              <a:latin typeface="微軟正黑體" pitchFamily="34" charset="-120"/>
-              <a:ea typeface="微軟正黑體" pitchFamily="34" charset="-120"/>
-            </a:endParaRPr>
-          </a:p>
-          <a:p>
-            <a:pPr algn="ctr">
-              <a:buNone/>
-            </a:pPr>
-            <a:r>
-              <a:rPr lang="zh-TW" altLang="en-US" sz="5400" b="1" dirty="0" smtClean="0">
+              <a:rPr lang="zh-TW" altLang="en-US" sz="4800" b="1" dirty="0">
                 <a:solidFill>
                   <a:srgbClr val="660033"/>
                 </a:solidFill>

</xml_diff>